<commit_message>
ppt update with some more points
</commit_message>
<xml_diff>
--- a/docs/craftsDemo.pptx
+++ b/docs/craftsDemo.pptx
@@ -5,10 +5,10 @@
     <p:sldMasterId id="2147483648" r:id="rId4"/>
   </p:sldMasterIdLst>
   <p:notesMasterIdLst>
-    <p:notesMasterId r:id="rId28"/>
+    <p:notesMasterId r:id="rId27"/>
   </p:notesMasterIdLst>
   <p:handoutMasterIdLst>
-    <p:handoutMasterId r:id="rId29"/>
+    <p:handoutMasterId r:id="rId28"/>
   </p:handoutMasterIdLst>
   <p:sldIdLst>
     <p:sldId id="298" r:id="rId5"/>
@@ -25,15 +25,14 @@
     <p:sldId id="308" r:id="rId16"/>
     <p:sldId id="309" r:id="rId17"/>
     <p:sldId id="310" r:id="rId18"/>
-    <p:sldId id="311" r:id="rId19"/>
-    <p:sldId id="317" r:id="rId20"/>
-    <p:sldId id="312" r:id="rId21"/>
-    <p:sldId id="313" r:id="rId22"/>
-    <p:sldId id="314" r:id="rId23"/>
-    <p:sldId id="315" r:id="rId24"/>
-    <p:sldId id="316" r:id="rId25"/>
-    <p:sldId id="285" r:id="rId26"/>
-    <p:sldId id="296" r:id="rId27"/>
+    <p:sldId id="317" r:id="rId19"/>
+    <p:sldId id="312" r:id="rId20"/>
+    <p:sldId id="313" r:id="rId21"/>
+    <p:sldId id="314" r:id="rId22"/>
+    <p:sldId id="315" r:id="rId23"/>
+    <p:sldId id="316" r:id="rId24"/>
+    <p:sldId id="285" r:id="rId25"/>
+    <p:sldId id="296" r:id="rId26"/>
   </p:sldIdLst>
   <p:sldSz cx="12192000" cy="6858000"/>
   <p:notesSz cx="6858000" cy="9144000"/>
@@ -5279,7 +5278,7 @@
           <a:p>
             <a:fld id="{EF1077DB-935E-4A0A-947A-D283B9F9F452}" type="datetimeFigureOut">
               <a:rPr lang="en-US" smtClean="0"/>
-              <a:t>8/2/2023</a:t>
+              <a:t>8/3/2023</a:t>
             </a:fld>
             <a:endParaRPr lang="en-US" dirty="0"/>
           </a:p>
@@ -5456,7 +5455,7 @@
           <a:p>
             <a:fld id="{2D9EC30E-1A71-4188-9BE7-E2A64929A436}" type="datetimeFigureOut">
               <a:rPr lang="en-US" noProof="0" smtClean="0"/>
-              <a:t>8/2/2023</a:t>
+              <a:t>8/3/2023</a:t>
             </a:fld>
             <a:endParaRPr lang="en-US" noProof="0" dirty="0"/>
           </a:p>
@@ -15889,7 +15888,7 @@
           <p:cNvPr id="3" name="Title 2">
             <a:extLst>
               <a:ext uri="{FF2B5EF4-FFF2-40B4-BE49-F238E27FC236}">
-                <a16:creationId xmlns:a16="http://schemas.microsoft.com/office/drawing/2014/main" id="{9EC49724-8BB0-4363-AB26-07783E61A958}"/>
+                <a16:creationId xmlns:a16="http://schemas.microsoft.com/office/drawing/2014/main" id="{FA8AEB88-DDB9-483D-8966-7E4F40C46847}"/>
               </a:ext>
             </a:extLst>
           </p:cNvPr>
@@ -15907,7 +15906,15 @@
           <a:p>
             <a:r>
               <a:rPr lang="en-IN" dirty="0"/>
-              <a:t>Integration Test</a:t>
+              <a:t>Show </a:t>
+            </a:r>
+            <a:r>
+              <a:rPr lang="en-IN" dirty="0" err="1"/>
+              <a:t>api</a:t>
+            </a:r>
+            <a:r>
+              <a:rPr lang="en-IN" dirty="0"/>
+              <a:t> (postman)</a:t>
             </a:r>
           </a:p>
         </p:txBody>
@@ -15917,7 +15924,7 @@
           <p:cNvPr id="4" name="Text Placeholder 3">
             <a:extLst>
               <a:ext uri="{FF2B5EF4-FFF2-40B4-BE49-F238E27FC236}">
-                <a16:creationId xmlns:a16="http://schemas.microsoft.com/office/drawing/2014/main" id="{81B9A97F-86E0-4A52-87FB-E6D14E8DC2C3}"/>
+                <a16:creationId xmlns:a16="http://schemas.microsoft.com/office/drawing/2014/main" id="{721F3B2F-9113-430A-9020-1C6214526BCA}"/>
               </a:ext>
             </a:extLst>
           </p:cNvPr>
@@ -15942,7 +15949,7 @@
           <p:cNvPr id="6" name="Footer Placeholder 5">
             <a:extLst>
               <a:ext uri="{FF2B5EF4-FFF2-40B4-BE49-F238E27FC236}">
-                <a16:creationId xmlns:a16="http://schemas.microsoft.com/office/drawing/2014/main" id="{4E2B211E-FFEC-44AF-9EF1-13AB0980B6CF}"/>
+                <a16:creationId xmlns:a16="http://schemas.microsoft.com/office/drawing/2014/main" id="{1FBA7395-08A2-40EA-AE7A-A961795B15AA}"/>
               </a:ext>
             </a:extLst>
           </p:cNvPr>
@@ -15971,7 +15978,7 @@
           <p:cNvPr id="7" name="Slide Number Placeholder 6">
             <a:extLst>
               <a:ext uri="{FF2B5EF4-FFF2-40B4-BE49-F238E27FC236}">
-                <a16:creationId xmlns:a16="http://schemas.microsoft.com/office/drawing/2014/main" id="{DCFE1C92-DB91-41DF-8253-F83CE7794D01}"/>
+                <a16:creationId xmlns:a16="http://schemas.microsoft.com/office/drawing/2014/main" id="{776E3273-FD46-4213-A0FA-F78FE91469BC}"/>
               </a:ext>
             </a:extLst>
           </p:cNvPr>
@@ -15996,146 +16003,16 @@
           </a:p>
         </p:txBody>
       </p:sp>
-      <p:sp>
-        <p:nvSpPr>
-          <p:cNvPr id="8" name="TextBox 7">
-            <a:extLst>
-              <a:ext uri="{FF2B5EF4-FFF2-40B4-BE49-F238E27FC236}">
-                <a16:creationId xmlns:a16="http://schemas.microsoft.com/office/drawing/2014/main" id="{7C1A899A-D21F-4ADA-8814-CFB590865ECE}"/>
-              </a:ext>
-            </a:extLst>
-          </p:cNvPr>
-          <p:cNvSpPr txBox="1"/>
-          <p:nvPr/>
-        </p:nvSpPr>
-        <p:spPr>
-          <a:xfrm>
-            <a:off x="942392" y="1869795"/>
-            <a:ext cx="3256384" cy="1477328"/>
-          </a:xfrm>
-          <a:prstGeom prst="rect">
-            <a:avLst/>
-          </a:prstGeom>
-          <a:noFill/>
-        </p:spPr>
-        <p:txBody>
-          <a:bodyPr wrap="square" rtlCol="0">
-            <a:spAutoFit/>
-          </a:bodyPr>
-          <a:lstStyle/>
-          <a:p>
-            <a:r>
-              <a:rPr lang="en-IN" dirty="0"/>
-              <a:t>Could not taken in any integration test due to time constraint</a:t>
-            </a:r>
-          </a:p>
-          <a:p>
-            <a:endParaRPr lang="en-IN" dirty="0"/>
-          </a:p>
-          <a:p>
-            <a:r>
-              <a:rPr lang="en-IN" dirty="0"/>
-              <a:t>However it is vital to go live.</a:t>
-            </a:r>
-          </a:p>
-        </p:txBody>
-      </p:sp>
     </p:spTree>
     <p:extLst>
       <p:ext uri="{BB962C8B-B14F-4D97-AF65-F5344CB8AC3E}">
-        <p14:creationId xmlns:p14="http://schemas.microsoft.com/office/powerpoint/2010/main" val="3089539266"/>
+        <p14:creationId xmlns:p14="http://schemas.microsoft.com/office/powerpoint/2010/main" val="2665022405"/>
       </p:ext>
     </p:extLst>
   </p:cSld>
   <p:clrMapOvr>
     <a:masterClrMapping/>
   </p:clrMapOvr>
-  <p:timing>
-    <p:tnLst>
-      <p:par>
-        <p:cTn id="1" dur="indefinite" restart="never" nodeType="tmRoot">
-          <p:childTnLst>
-            <p:seq concurrent="1" nextAc="seek">
-              <p:cTn id="2" dur="indefinite" nodeType="mainSeq">
-                <p:childTnLst>
-                  <p:par>
-                    <p:cTn id="3" fill="hold">
-                      <p:stCondLst>
-                        <p:cond delay="indefinite"/>
-                      </p:stCondLst>
-                      <p:childTnLst>
-                        <p:par>
-                          <p:cTn id="4" fill="hold">
-                            <p:stCondLst>
-                              <p:cond delay="0"/>
-                            </p:stCondLst>
-                            <p:childTnLst>
-                              <p:par>
-                                <p:cTn id="5" presetID="10" presetClass="entr" presetSubtype="0" fill="hold" grpId="0" nodeType="clickEffect">
-                                  <p:stCondLst>
-                                    <p:cond delay="0"/>
-                                  </p:stCondLst>
-                                  <p:childTnLst>
-                                    <p:set>
-                                      <p:cBhvr>
-                                        <p:cTn id="6" dur="1" fill="hold">
-                                          <p:stCondLst>
-                                            <p:cond delay="0"/>
-                                          </p:stCondLst>
-                                        </p:cTn>
-                                        <p:tgtEl>
-                                          <p:spTgt spid="8"/>
-                                        </p:tgtEl>
-                                        <p:attrNameLst>
-                                          <p:attrName>style.visibility</p:attrName>
-                                        </p:attrNameLst>
-                                      </p:cBhvr>
-                                      <p:to>
-                                        <p:strVal val="visible"/>
-                                      </p:to>
-                                    </p:set>
-                                    <p:animEffect transition="in" filter="fade">
-                                      <p:cBhvr>
-                                        <p:cTn id="7" dur="500"/>
-                                        <p:tgtEl>
-                                          <p:spTgt spid="8"/>
-                                        </p:tgtEl>
-                                      </p:cBhvr>
-                                    </p:animEffect>
-                                  </p:childTnLst>
-                                </p:cTn>
-                              </p:par>
-                            </p:childTnLst>
-                          </p:cTn>
-                        </p:par>
-                      </p:childTnLst>
-                    </p:cTn>
-                  </p:par>
-                </p:childTnLst>
-              </p:cTn>
-              <p:prevCondLst>
-                <p:cond evt="onPrev" delay="0">
-                  <p:tgtEl>
-                    <p:sldTgt/>
-                  </p:tgtEl>
-                </p:cond>
-              </p:prevCondLst>
-              <p:nextCondLst>
-                <p:cond evt="onNext" delay="0">
-                  <p:tgtEl>
-                    <p:sldTgt/>
-                  </p:tgtEl>
-                </p:cond>
-              </p:nextCondLst>
-            </p:seq>
-          </p:childTnLst>
-        </p:cTn>
-      </p:par>
-    </p:tnLst>
-    <p:bldLst>
-      <p:bldP spid="8" grpId="0"/>
-    </p:bldLst>
-  </p:timing>
 </p:sld>
 </file>
 
@@ -16161,7 +16038,7 @@
           <p:cNvPr id="3" name="Title 2">
             <a:extLst>
               <a:ext uri="{FF2B5EF4-FFF2-40B4-BE49-F238E27FC236}">
-                <a16:creationId xmlns:a16="http://schemas.microsoft.com/office/drawing/2014/main" id="{FA8AEB88-DDB9-483D-8966-7E4F40C46847}"/>
+                <a16:creationId xmlns:a16="http://schemas.microsoft.com/office/drawing/2014/main" id="{72DFEA54-05D3-43EE-9AC2-41EC76C62020}"/>
               </a:ext>
             </a:extLst>
           </p:cNvPr>
@@ -16172,22 +16049,19 @@
             <p:ph type="title"/>
           </p:nvPr>
         </p:nvSpPr>
-        <p:spPr/>
+        <p:spPr>
+          <a:xfrm>
+            <a:off x="5118100" y="1175657"/>
+            <a:ext cx="6641900" cy="1818483"/>
+          </a:xfrm>
+        </p:spPr>
         <p:txBody>
           <a:bodyPr/>
           <a:lstStyle/>
           <a:p>
             <a:r>
               <a:rPr lang="en-IN" dirty="0"/>
-              <a:t>Show </a:t>
-            </a:r>
-            <a:r>
-              <a:rPr lang="en-IN" dirty="0" err="1"/>
-              <a:t>api</a:t>
-            </a:r>
-            <a:r>
-              <a:rPr lang="en-IN" dirty="0"/>
-              <a:t> (postman)</a:t>
+              <a:t>Back End Deployment</a:t>
             </a:r>
           </a:p>
         </p:txBody>
@@ -16197,7 +16071,7 @@
           <p:cNvPr id="4" name="Text Placeholder 3">
             <a:extLst>
               <a:ext uri="{FF2B5EF4-FFF2-40B4-BE49-F238E27FC236}">
-                <a16:creationId xmlns:a16="http://schemas.microsoft.com/office/drawing/2014/main" id="{721F3B2F-9113-430A-9020-1C6214526BCA}"/>
+                <a16:creationId xmlns:a16="http://schemas.microsoft.com/office/drawing/2014/main" id="{786890DC-5CF3-45D5-9461-700DAE4D6EAF}"/>
               </a:ext>
             </a:extLst>
           </p:cNvPr>
@@ -16219,18 +16093,18 @@
       </p:sp>
       <p:sp>
         <p:nvSpPr>
-          <p:cNvPr id="6" name="Footer Placeholder 5">
-            <a:extLst>
-              <a:ext uri="{FF2B5EF4-FFF2-40B4-BE49-F238E27FC236}">
-                <a16:creationId xmlns:a16="http://schemas.microsoft.com/office/drawing/2014/main" id="{1FBA7395-08A2-40EA-AE7A-A961795B15AA}"/>
-              </a:ext>
-            </a:extLst>
-          </p:cNvPr>
-          <p:cNvSpPr>
-            <a:spLocks noGrp="1"/>
-          </p:cNvSpPr>
-          <p:nvPr>
-            <p:ph type="ftr" sz="quarter" idx="13"/>
+          <p:cNvPr id="5" name="Content Placeholder 4">
+            <a:extLst>
+              <a:ext uri="{FF2B5EF4-FFF2-40B4-BE49-F238E27FC236}">
+                <a16:creationId xmlns:a16="http://schemas.microsoft.com/office/drawing/2014/main" id="{D92043A8-F288-466B-8464-676D59A9A43B}"/>
+              </a:ext>
+            </a:extLst>
+          </p:cNvPr>
+          <p:cNvSpPr>
+            <a:spLocks noGrp="1"/>
+          </p:cNvSpPr>
+          <p:nvPr>
+            <p:ph sz="half" idx="1"/>
           </p:nvPr>
         </p:nvSpPr>
         <p:spPr/>
@@ -16238,6 +16112,31 @@
           <a:bodyPr/>
           <a:lstStyle/>
           <a:p>
+            <a:endParaRPr lang="en-IN"/>
+          </a:p>
+        </p:txBody>
+      </p:sp>
+      <p:sp>
+        <p:nvSpPr>
+          <p:cNvPr id="6" name="Footer Placeholder 5">
+            <a:extLst>
+              <a:ext uri="{FF2B5EF4-FFF2-40B4-BE49-F238E27FC236}">
+                <a16:creationId xmlns:a16="http://schemas.microsoft.com/office/drawing/2014/main" id="{D36BC672-719C-4F28-AD5E-CD36AF5393FC}"/>
+              </a:ext>
+            </a:extLst>
+          </p:cNvPr>
+          <p:cNvSpPr>
+            <a:spLocks noGrp="1"/>
+          </p:cNvSpPr>
+          <p:nvPr>
+            <p:ph type="ftr" sz="quarter" idx="13"/>
+          </p:nvPr>
+        </p:nvSpPr>
+        <p:spPr/>
+        <p:txBody>
+          <a:bodyPr/>
+          <a:lstStyle/>
+          <a:p>
             <a:r>
               <a:rPr lang="en-US" noProof="0"/>
               <a:t>Soumya Mondal @ 2023</a:t>
@@ -16251,7 +16150,7 @@
           <p:cNvPr id="7" name="Slide Number Placeholder 6">
             <a:extLst>
               <a:ext uri="{FF2B5EF4-FFF2-40B4-BE49-F238E27FC236}">
-                <a16:creationId xmlns:a16="http://schemas.microsoft.com/office/drawing/2014/main" id="{776E3273-FD46-4213-A0FA-F78FE91469BC}"/>
+                <a16:creationId xmlns:a16="http://schemas.microsoft.com/office/drawing/2014/main" id="{FF50D881-96D3-4415-95A2-693B4FC73B34}"/>
               </a:ext>
             </a:extLst>
           </p:cNvPr>
@@ -16279,7 +16178,7 @@
     </p:spTree>
     <p:extLst>
       <p:ext uri="{BB962C8B-B14F-4D97-AF65-F5344CB8AC3E}">
-        <p14:creationId xmlns:p14="http://schemas.microsoft.com/office/powerpoint/2010/main" val="2665022405"/>
+        <p14:creationId xmlns:p14="http://schemas.microsoft.com/office/powerpoint/2010/main" val="1768788863"/>
       </p:ext>
     </p:extLst>
   </p:cSld>
@@ -16311,7 +16210,7 @@
           <p:cNvPr id="3" name="Title 2">
             <a:extLst>
               <a:ext uri="{FF2B5EF4-FFF2-40B4-BE49-F238E27FC236}">
-                <a16:creationId xmlns:a16="http://schemas.microsoft.com/office/drawing/2014/main" id="{72DFEA54-05D3-43EE-9AC2-41EC76C62020}"/>
+                <a16:creationId xmlns:a16="http://schemas.microsoft.com/office/drawing/2014/main" id="{BE14E5F6-DCED-4E25-AED7-703B5F4D2D86}"/>
               </a:ext>
             </a:extLst>
           </p:cNvPr>
@@ -16322,19 +16221,14 @@
             <p:ph type="title"/>
           </p:nvPr>
         </p:nvSpPr>
-        <p:spPr>
-          <a:xfrm>
-            <a:off x="5118100" y="1175657"/>
-            <a:ext cx="6641900" cy="1818483"/>
-          </a:xfrm>
-        </p:spPr>
+        <p:spPr/>
         <p:txBody>
           <a:bodyPr/>
           <a:lstStyle/>
           <a:p>
             <a:r>
               <a:rPr lang="en-IN" dirty="0"/>
-              <a:t>Back End Deployment</a:t>
+              <a:t>Insight of UI</a:t>
             </a:r>
           </a:p>
         </p:txBody>
@@ -16344,7 +16238,7 @@
           <p:cNvPr id="4" name="Text Placeholder 3">
             <a:extLst>
               <a:ext uri="{FF2B5EF4-FFF2-40B4-BE49-F238E27FC236}">
-                <a16:creationId xmlns:a16="http://schemas.microsoft.com/office/drawing/2014/main" id="{786890DC-5CF3-45D5-9461-700DAE4D6EAF}"/>
+                <a16:creationId xmlns:a16="http://schemas.microsoft.com/office/drawing/2014/main" id="{1918D228-0AFB-4EB7-84A4-B16E2B469DD2}"/>
               </a:ext>
             </a:extLst>
           </p:cNvPr>
@@ -16369,7 +16263,7 @@
           <p:cNvPr id="5" name="Content Placeholder 4">
             <a:extLst>
               <a:ext uri="{FF2B5EF4-FFF2-40B4-BE49-F238E27FC236}">
-                <a16:creationId xmlns:a16="http://schemas.microsoft.com/office/drawing/2014/main" id="{D92043A8-F288-466B-8464-676D59A9A43B}"/>
+                <a16:creationId xmlns:a16="http://schemas.microsoft.com/office/drawing/2014/main" id="{1CDF36EE-A112-439B-AB79-3BCA38E75609}"/>
               </a:ext>
             </a:extLst>
           </p:cNvPr>
@@ -16394,7 +16288,7 @@
           <p:cNvPr id="6" name="Footer Placeholder 5">
             <a:extLst>
               <a:ext uri="{FF2B5EF4-FFF2-40B4-BE49-F238E27FC236}">
-                <a16:creationId xmlns:a16="http://schemas.microsoft.com/office/drawing/2014/main" id="{D36BC672-719C-4F28-AD5E-CD36AF5393FC}"/>
+                <a16:creationId xmlns:a16="http://schemas.microsoft.com/office/drawing/2014/main" id="{4A9F39C4-1C45-4F38-8700-74A9B40A6708}"/>
               </a:ext>
             </a:extLst>
           </p:cNvPr>
@@ -16423,7 +16317,7 @@
           <p:cNvPr id="7" name="Slide Number Placeholder 6">
             <a:extLst>
               <a:ext uri="{FF2B5EF4-FFF2-40B4-BE49-F238E27FC236}">
-                <a16:creationId xmlns:a16="http://schemas.microsoft.com/office/drawing/2014/main" id="{FF50D881-96D3-4415-95A2-693B4FC73B34}"/>
+                <a16:creationId xmlns:a16="http://schemas.microsoft.com/office/drawing/2014/main" id="{106BA1EC-1657-406D-813C-BD3C9C607816}"/>
               </a:ext>
             </a:extLst>
           </p:cNvPr>
@@ -16451,7 +16345,7 @@
     </p:spTree>
     <p:extLst>
       <p:ext uri="{BB962C8B-B14F-4D97-AF65-F5344CB8AC3E}">
-        <p14:creationId xmlns:p14="http://schemas.microsoft.com/office/powerpoint/2010/main" val="1768788863"/>
+        <p14:creationId xmlns:p14="http://schemas.microsoft.com/office/powerpoint/2010/main" val="3427370555"/>
       </p:ext>
     </p:extLst>
   </p:cSld>
@@ -16483,7 +16377,7 @@
           <p:cNvPr id="3" name="Title 2">
             <a:extLst>
               <a:ext uri="{FF2B5EF4-FFF2-40B4-BE49-F238E27FC236}">
-                <a16:creationId xmlns:a16="http://schemas.microsoft.com/office/drawing/2014/main" id="{BE14E5F6-DCED-4E25-AED7-703B5F4D2D86}"/>
+                <a16:creationId xmlns:a16="http://schemas.microsoft.com/office/drawing/2014/main" id="{4F21AB04-0FE7-468D-BDDD-2FE81B85CAAF}"/>
               </a:ext>
             </a:extLst>
           </p:cNvPr>
@@ -16501,7 +16395,7 @@
           <a:p>
             <a:r>
               <a:rPr lang="en-IN" dirty="0"/>
-              <a:t>Insight of UI</a:t>
+              <a:t>SSL and Security</a:t>
             </a:r>
           </a:p>
         </p:txBody>
@@ -16511,7 +16405,7 @@
           <p:cNvPr id="4" name="Text Placeholder 3">
             <a:extLst>
               <a:ext uri="{FF2B5EF4-FFF2-40B4-BE49-F238E27FC236}">
-                <a16:creationId xmlns:a16="http://schemas.microsoft.com/office/drawing/2014/main" id="{1918D228-0AFB-4EB7-84A4-B16E2B469DD2}"/>
+                <a16:creationId xmlns:a16="http://schemas.microsoft.com/office/drawing/2014/main" id="{F9F0D56C-DF2E-4C9D-A07E-4CD6D84C6CF2}"/>
               </a:ext>
             </a:extLst>
           </p:cNvPr>
@@ -16536,7 +16430,7 @@
           <p:cNvPr id="5" name="Content Placeholder 4">
             <a:extLst>
               <a:ext uri="{FF2B5EF4-FFF2-40B4-BE49-F238E27FC236}">
-                <a16:creationId xmlns:a16="http://schemas.microsoft.com/office/drawing/2014/main" id="{1CDF36EE-A112-439B-AB79-3BCA38E75609}"/>
+                <a16:creationId xmlns:a16="http://schemas.microsoft.com/office/drawing/2014/main" id="{9F833954-DC22-4586-9504-EA4B587A20F4}"/>
               </a:ext>
             </a:extLst>
           </p:cNvPr>
@@ -16561,7 +16455,7 @@
           <p:cNvPr id="6" name="Footer Placeholder 5">
             <a:extLst>
               <a:ext uri="{FF2B5EF4-FFF2-40B4-BE49-F238E27FC236}">
-                <a16:creationId xmlns:a16="http://schemas.microsoft.com/office/drawing/2014/main" id="{4A9F39C4-1C45-4F38-8700-74A9B40A6708}"/>
+                <a16:creationId xmlns:a16="http://schemas.microsoft.com/office/drawing/2014/main" id="{6BD7C66D-09D4-42A2-B37E-F56BC00CA726}"/>
               </a:ext>
             </a:extLst>
           </p:cNvPr>
@@ -16590,7 +16484,7 @@
           <p:cNvPr id="7" name="Slide Number Placeholder 6">
             <a:extLst>
               <a:ext uri="{FF2B5EF4-FFF2-40B4-BE49-F238E27FC236}">
-                <a16:creationId xmlns:a16="http://schemas.microsoft.com/office/drawing/2014/main" id="{106BA1EC-1657-406D-813C-BD3C9C607816}"/>
+                <a16:creationId xmlns:a16="http://schemas.microsoft.com/office/drawing/2014/main" id="{FDC882E8-058B-4621-8DCD-5FE6E86F58A7}"/>
               </a:ext>
             </a:extLst>
           </p:cNvPr>
@@ -16618,7 +16512,7 @@
     </p:spTree>
     <p:extLst>
       <p:ext uri="{BB962C8B-B14F-4D97-AF65-F5344CB8AC3E}">
-        <p14:creationId xmlns:p14="http://schemas.microsoft.com/office/powerpoint/2010/main" val="3427370555"/>
+        <p14:creationId xmlns:p14="http://schemas.microsoft.com/office/powerpoint/2010/main" val="3073772772"/>
       </p:ext>
     </p:extLst>
   </p:cSld>
@@ -16650,7 +16544,7 @@
           <p:cNvPr id="3" name="Title 2">
             <a:extLst>
               <a:ext uri="{FF2B5EF4-FFF2-40B4-BE49-F238E27FC236}">
-                <a16:creationId xmlns:a16="http://schemas.microsoft.com/office/drawing/2014/main" id="{4F21AB04-0FE7-468D-BDDD-2FE81B85CAAF}"/>
+                <a16:creationId xmlns:a16="http://schemas.microsoft.com/office/drawing/2014/main" id="{F827E8F7-24A4-49EE-B02E-BDE1D98C1F10}"/>
               </a:ext>
             </a:extLst>
           </p:cNvPr>
@@ -16668,7 +16562,7 @@
           <a:p>
             <a:r>
               <a:rPr lang="en-IN" dirty="0"/>
-              <a:t>SSL and Security</a:t>
+              <a:t>UI Deployment</a:t>
             </a:r>
           </a:p>
         </p:txBody>
@@ -16678,7 +16572,7 @@
           <p:cNvPr id="4" name="Text Placeholder 3">
             <a:extLst>
               <a:ext uri="{FF2B5EF4-FFF2-40B4-BE49-F238E27FC236}">
-                <a16:creationId xmlns:a16="http://schemas.microsoft.com/office/drawing/2014/main" id="{F9F0D56C-DF2E-4C9D-A07E-4CD6D84C6CF2}"/>
+                <a16:creationId xmlns:a16="http://schemas.microsoft.com/office/drawing/2014/main" id="{8FCE7F13-B755-4B96-8132-2F82D442F110}"/>
               </a:ext>
             </a:extLst>
           </p:cNvPr>
@@ -16700,18 +16594,18 @@
       </p:sp>
       <p:sp>
         <p:nvSpPr>
-          <p:cNvPr id="5" name="Content Placeholder 4">
-            <a:extLst>
-              <a:ext uri="{FF2B5EF4-FFF2-40B4-BE49-F238E27FC236}">
-                <a16:creationId xmlns:a16="http://schemas.microsoft.com/office/drawing/2014/main" id="{9F833954-DC22-4586-9504-EA4B587A20F4}"/>
-              </a:ext>
-            </a:extLst>
-          </p:cNvPr>
-          <p:cNvSpPr>
-            <a:spLocks noGrp="1"/>
-          </p:cNvSpPr>
-          <p:nvPr>
-            <p:ph sz="half" idx="1"/>
+          <p:cNvPr id="6" name="Footer Placeholder 5">
+            <a:extLst>
+              <a:ext uri="{FF2B5EF4-FFF2-40B4-BE49-F238E27FC236}">
+                <a16:creationId xmlns:a16="http://schemas.microsoft.com/office/drawing/2014/main" id="{9ECB1BDB-6B89-4334-BEBE-B38FFD4E40A2}"/>
+              </a:ext>
+            </a:extLst>
+          </p:cNvPr>
+          <p:cNvSpPr>
+            <a:spLocks noGrp="1"/>
+          </p:cNvSpPr>
+          <p:nvPr>
+            <p:ph type="ftr" sz="quarter" idx="13"/>
           </p:nvPr>
         </p:nvSpPr>
         <p:spPr/>
@@ -16719,31 +16613,6 @@
           <a:bodyPr/>
           <a:lstStyle/>
           <a:p>
-            <a:endParaRPr lang="en-IN"/>
-          </a:p>
-        </p:txBody>
-      </p:sp>
-      <p:sp>
-        <p:nvSpPr>
-          <p:cNvPr id="6" name="Footer Placeholder 5">
-            <a:extLst>
-              <a:ext uri="{FF2B5EF4-FFF2-40B4-BE49-F238E27FC236}">
-                <a16:creationId xmlns:a16="http://schemas.microsoft.com/office/drawing/2014/main" id="{6BD7C66D-09D4-42A2-B37E-F56BC00CA726}"/>
-              </a:ext>
-            </a:extLst>
-          </p:cNvPr>
-          <p:cNvSpPr>
-            <a:spLocks noGrp="1"/>
-          </p:cNvSpPr>
-          <p:nvPr>
-            <p:ph type="ftr" sz="quarter" idx="13"/>
-          </p:nvPr>
-        </p:nvSpPr>
-        <p:spPr/>
-        <p:txBody>
-          <a:bodyPr/>
-          <a:lstStyle/>
-          <a:p>
             <a:r>
               <a:rPr lang="en-US" noProof="0"/>
               <a:t>Soumya Mondal @ 2023</a:t>
@@ -16757,7 +16626,7 @@
           <p:cNvPr id="7" name="Slide Number Placeholder 6">
             <a:extLst>
               <a:ext uri="{FF2B5EF4-FFF2-40B4-BE49-F238E27FC236}">
-                <a16:creationId xmlns:a16="http://schemas.microsoft.com/office/drawing/2014/main" id="{FDC882E8-058B-4621-8DCD-5FE6E86F58A7}"/>
+                <a16:creationId xmlns:a16="http://schemas.microsoft.com/office/drawing/2014/main" id="{84A998B8-3BD5-4A6E-9CB9-A0BFE442BFA1}"/>
               </a:ext>
             </a:extLst>
           </p:cNvPr>
@@ -16785,7 +16654,7 @@
     </p:spTree>
     <p:extLst>
       <p:ext uri="{BB962C8B-B14F-4D97-AF65-F5344CB8AC3E}">
-        <p14:creationId xmlns:p14="http://schemas.microsoft.com/office/powerpoint/2010/main" val="3073772772"/>
+        <p14:creationId xmlns:p14="http://schemas.microsoft.com/office/powerpoint/2010/main" val="1625613068"/>
       </p:ext>
     </p:extLst>
   </p:cSld>
@@ -17164,7 +17033,7 @@
           <p:cNvPr id="3" name="Title 2">
             <a:extLst>
               <a:ext uri="{FF2B5EF4-FFF2-40B4-BE49-F238E27FC236}">
-                <a16:creationId xmlns:a16="http://schemas.microsoft.com/office/drawing/2014/main" id="{F827E8F7-24A4-49EE-B02E-BDE1D98C1F10}"/>
+                <a16:creationId xmlns:a16="http://schemas.microsoft.com/office/drawing/2014/main" id="{CC262617-1F14-4418-AD09-20D81E7BD1E5}"/>
               </a:ext>
             </a:extLst>
           </p:cNvPr>
@@ -17182,7 +17051,7 @@
           <a:p>
             <a:r>
               <a:rPr lang="en-IN" dirty="0"/>
-              <a:t>UI Deployment</a:t>
+              <a:t>Future enhancement</a:t>
             </a:r>
           </a:p>
         </p:txBody>
@@ -17192,7 +17061,7 @@
           <p:cNvPr id="4" name="Text Placeholder 3">
             <a:extLst>
               <a:ext uri="{FF2B5EF4-FFF2-40B4-BE49-F238E27FC236}">
-                <a16:creationId xmlns:a16="http://schemas.microsoft.com/office/drawing/2014/main" id="{8FCE7F13-B755-4B96-8132-2F82D442F110}"/>
+                <a16:creationId xmlns:a16="http://schemas.microsoft.com/office/drawing/2014/main" id="{4F31A03D-9B2C-4985-AB0F-1D5E8969B603}"/>
               </a:ext>
             </a:extLst>
           </p:cNvPr>
@@ -17217,7 +17086,7 @@
           <p:cNvPr id="6" name="Footer Placeholder 5">
             <a:extLst>
               <a:ext uri="{FF2B5EF4-FFF2-40B4-BE49-F238E27FC236}">
-                <a16:creationId xmlns:a16="http://schemas.microsoft.com/office/drawing/2014/main" id="{9ECB1BDB-6B89-4334-BEBE-B38FFD4E40A2}"/>
+                <a16:creationId xmlns:a16="http://schemas.microsoft.com/office/drawing/2014/main" id="{A1C8734D-A757-4629-AD01-C77D464D8F04}"/>
               </a:ext>
             </a:extLst>
           </p:cNvPr>
@@ -17246,7 +17115,7 @@
           <p:cNvPr id="7" name="Slide Number Placeholder 6">
             <a:extLst>
               <a:ext uri="{FF2B5EF4-FFF2-40B4-BE49-F238E27FC236}">
-                <a16:creationId xmlns:a16="http://schemas.microsoft.com/office/drawing/2014/main" id="{84A998B8-3BD5-4A6E-9CB9-A0BFE442BFA1}"/>
+                <a16:creationId xmlns:a16="http://schemas.microsoft.com/office/drawing/2014/main" id="{88FE1683-CD2E-465B-8A82-DB74174413FF}"/>
               </a:ext>
             </a:extLst>
           </p:cNvPr>
@@ -17271,10 +17140,172 @@
           </a:p>
         </p:txBody>
       </p:sp>
+      <p:sp>
+        <p:nvSpPr>
+          <p:cNvPr id="8" name="TextBox 7">
+            <a:extLst>
+              <a:ext uri="{FF2B5EF4-FFF2-40B4-BE49-F238E27FC236}">
+                <a16:creationId xmlns:a16="http://schemas.microsoft.com/office/drawing/2014/main" id="{DB9D1DB0-D0B9-47DF-A5BB-6205D1C35B75}"/>
+              </a:ext>
+            </a:extLst>
+          </p:cNvPr>
+          <p:cNvSpPr txBox="1"/>
+          <p:nvPr/>
+        </p:nvSpPr>
+        <p:spPr>
+          <a:xfrm>
+            <a:off x="597159" y="270588"/>
+            <a:ext cx="3928187" cy="5109091"/>
+          </a:xfrm>
+          <a:prstGeom prst="rect">
+            <a:avLst/>
+          </a:prstGeom>
+          <a:noFill/>
+        </p:spPr>
+        <p:txBody>
+          <a:bodyPr wrap="square" rtlCol="0">
+            <a:spAutoFit/>
+          </a:bodyPr>
+          <a:lstStyle/>
+          <a:p>
+            <a:pPr marL="342900" indent="-342900">
+              <a:buAutoNum type="arabicPeriod"/>
+            </a:pPr>
+            <a:r>
+              <a:rPr lang="en-IN" sz="1400" dirty="0"/>
+              <a:t>Enhancement of health with Db check by </a:t>
+            </a:r>
+            <a:r>
+              <a:rPr lang="en-IN" sz="1400" dirty="0" err="1"/>
+              <a:t>HealthIndicator</a:t>
+            </a:r>
+            <a:r>
+              <a:rPr lang="en-IN" sz="1400" dirty="0"/>
+              <a:t> </a:t>
+            </a:r>
+            <a:r>
+              <a:rPr lang="en-IN" sz="1400" dirty="0" err="1"/>
+              <a:t>api</a:t>
+            </a:r>
+            <a:endParaRPr lang="en-IN" sz="1400" dirty="0"/>
+          </a:p>
+          <a:p>
+            <a:pPr marL="342900" indent="-342900">
+              <a:buAutoNum type="arabicPeriod"/>
+            </a:pPr>
+            <a:r>
+              <a:rPr lang="en-IN" sz="1400" dirty="0"/>
+              <a:t>Having functionality of update profile of Funder and Fund raiser(back end is implemented though)</a:t>
+            </a:r>
+          </a:p>
+          <a:p>
+            <a:pPr marL="342900" indent="-342900">
+              <a:buAutoNum type="arabicPeriod"/>
+            </a:pPr>
+            <a:r>
+              <a:rPr lang="en-IN" sz="1400" dirty="0"/>
+              <a:t>Image of project /profile image and profile handling by AWS S3</a:t>
+            </a:r>
+          </a:p>
+          <a:p>
+            <a:pPr marL="342900" indent="-342900">
+              <a:buAutoNum type="arabicPeriod"/>
+            </a:pPr>
+            <a:r>
+              <a:rPr lang="en-IN" sz="1400" dirty="0"/>
+              <a:t>Chatting of funder and fundraiser functionality by Db and instant chatting window in UI</a:t>
+            </a:r>
+          </a:p>
+          <a:p>
+            <a:pPr marL="342900" indent="-342900">
+              <a:buAutoNum type="arabicPeriod"/>
+            </a:pPr>
+            <a:r>
+              <a:rPr lang="en-IN" sz="1400" dirty="0"/>
+              <a:t>Relationship of funder with funds being contributed. For time constraint it has been made  simple.</a:t>
+            </a:r>
+          </a:p>
+          <a:p>
+            <a:pPr marL="342900" indent="-342900">
+              <a:buAutoNum type="arabicPeriod"/>
+            </a:pPr>
+            <a:r>
+              <a:rPr lang="en-IN" sz="1400" dirty="0"/>
+              <a:t>Rating system of Fundraiser by overall collection. </a:t>
+            </a:r>
+          </a:p>
+          <a:p>
+            <a:pPr marL="342900" indent="-342900">
+              <a:buAutoNum type="arabicPeriod"/>
+            </a:pPr>
+            <a:r>
+              <a:rPr lang="en-IN" sz="1400" dirty="0"/>
+              <a:t>Addition of payment gateway for practical disbursement and addition of bank account/</a:t>
+            </a:r>
+            <a:r>
+              <a:rPr lang="en-IN" sz="1400" dirty="0" err="1"/>
+              <a:t>upi</a:t>
+            </a:r>
+            <a:r>
+              <a:rPr lang="en-IN" sz="1400" dirty="0"/>
+              <a:t> etc.</a:t>
+            </a:r>
+          </a:p>
+          <a:p>
+            <a:pPr marL="342900" indent="-342900">
+              <a:buAutoNum type="arabicPeriod"/>
+            </a:pPr>
+            <a:r>
+              <a:rPr lang="en-IN" sz="1400" dirty="0"/>
+              <a:t>Third party like </a:t>
+            </a:r>
+            <a:r>
+              <a:rPr lang="en-IN" sz="1400" dirty="0" err="1"/>
+              <a:t>pingID</a:t>
+            </a:r>
+            <a:r>
+              <a:rPr lang="en-IN" sz="1400" dirty="0"/>
+              <a:t>. </a:t>
+            </a:r>
+            <a:r>
+              <a:rPr lang="en-IN" sz="1400" dirty="0" err="1"/>
+              <a:t>azureAD</a:t>
+            </a:r>
+            <a:r>
+              <a:rPr lang="en-IN" sz="1400" dirty="0"/>
+              <a:t> etc for tokenization and authentication</a:t>
+            </a:r>
+          </a:p>
+          <a:p>
+            <a:pPr marL="342900" indent="-342900">
+              <a:buAutoNum type="arabicPeriod"/>
+            </a:pPr>
+            <a:r>
+              <a:rPr lang="en-IN" sz="1400" dirty="0"/>
+              <a:t>Emailing services from AWS SES or TWILIO </a:t>
+            </a:r>
+            <a:r>
+              <a:rPr lang="en-IN" sz="1400" dirty="0" err="1"/>
+              <a:t>sendgrid</a:t>
+            </a:r>
+            <a:r>
+              <a:rPr lang="en-IN" sz="1400"/>
+              <a:t> etc </a:t>
+            </a:r>
+            <a:endParaRPr lang="en-IN" sz="1400" dirty="0"/>
+          </a:p>
+          <a:p>
+            <a:pPr marL="342900" indent="-342900">
+              <a:buAutoNum type="arabicPeriod"/>
+            </a:pPr>
+            <a:endParaRPr lang="en-IN" dirty="0"/>
+          </a:p>
+        </p:txBody>
+      </p:sp>
     </p:spTree>
     <p:extLst>
       <p:ext uri="{BB962C8B-B14F-4D97-AF65-F5344CB8AC3E}">
-        <p14:creationId xmlns:p14="http://schemas.microsoft.com/office/powerpoint/2010/main" val="1625613068"/>
+        <p14:creationId xmlns:p14="http://schemas.microsoft.com/office/powerpoint/2010/main" val="4193078005"/>
       </p:ext>
     </p:extLst>
   </p:cSld>
@@ -17301,48 +17332,90 @@
           <a:chExt cx="0" cy="0"/>
         </a:xfrm>
       </p:grpSpPr>
-      <p:sp>
-        <p:nvSpPr>
-          <p:cNvPr id="3" name="Title 2">
-            <a:extLst>
-              <a:ext uri="{FF2B5EF4-FFF2-40B4-BE49-F238E27FC236}">
-                <a16:creationId xmlns:a16="http://schemas.microsoft.com/office/drawing/2014/main" id="{CC262617-1F14-4418-AD09-20D81E7BD1E5}"/>
-              </a:ext>
-            </a:extLst>
-          </p:cNvPr>
-          <p:cNvSpPr>
-            <a:spLocks noGrp="1"/>
-          </p:cNvSpPr>
-          <p:nvPr>
-            <p:ph type="title"/>
-          </p:nvPr>
-        </p:nvSpPr>
+      <p:pic>
+        <p:nvPicPr>
+          <p:cNvPr id="12" name="Picture Placeholder 11" descr="conference room">
+            <a:extLst>
+              <a:ext uri="{FF2B5EF4-FFF2-40B4-BE49-F238E27FC236}">
+                <a16:creationId xmlns:a16="http://schemas.microsoft.com/office/drawing/2014/main" id="{8F5AE0D5-C196-A947-8AFE-449A48B26153}"/>
+              </a:ext>
+            </a:extLst>
+          </p:cNvPr>
+          <p:cNvPicPr>
+            <a:picLocks noGrp="1" noChangeAspect="1"/>
+          </p:cNvPicPr>
+          <p:nvPr>
+            <p:ph type="pic" sz="quarter" idx="14"/>
+          </p:nvPr>
+        </p:nvPicPr>
+        <p:blipFill>
+          <a:blip r:embed="rId2" cstate="screen">
+            <a:extLst>
+              <a:ext uri="{28A0092B-C50C-407E-A947-70E740481C1C}">
+                <a14:useLocalDpi xmlns:a14="http://schemas.microsoft.com/office/drawing/2010/main"/>
+              </a:ext>
+            </a:extLst>
+          </a:blip>
+          <a:srcRect t="45" b="45"/>
+          <a:stretch>
+            <a:fillRect/>
+          </a:stretch>
+        </p:blipFill>
         <p:spPr/>
+      </p:pic>
+      <p:sp>
+        <p:nvSpPr>
+          <p:cNvPr id="4" name="Content Placeholder 3">
+            <a:extLst>
+              <a:ext uri="{FF2B5EF4-FFF2-40B4-BE49-F238E27FC236}">
+                <a16:creationId xmlns:a16="http://schemas.microsoft.com/office/drawing/2014/main" id="{3B86E961-B76E-423F-995E-11B31E921437}"/>
+              </a:ext>
+            </a:extLst>
+          </p:cNvPr>
+          <p:cNvSpPr>
+            <a:spLocks noGrp="1"/>
+          </p:cNvSpPr>
+          <p:nvPr>
+            <p:ph sz="half" idx="1"/>
+          </p:nvPr>
+        </p:nvSpPr>
+        <p:spPr>
+          <a:xfrm>
+            <a:off x="10566400" y="4445000"/>
+            <a:ext cx="1193600" cy="1480299"/>
+          </a:xfrm>
+          <a:solidFill>
+            <a:schemeClr val="tx1">
+              <a:lumMod val="95000"/>
+              <a:lumOff val="5000"/>
+            </a:schemeClr>
+          </a:solidFill>
+        </p:spPr>
         <p:txBody>
           <a:bodyPr/>
           <a:lstStyle/>
           <a:p>
             <a:r>
-              <a:rPr lang="en-IN" dirty="0"/>
-              <a:t>Future enhancement</a:t>
-            </a:r>
-          </a:p>
-        </p:txBody>
-      </p:sp>
-      <p:sp>
-        <p:nvSpPr>
-          <p:cNvPr id="4" name="Text Placeholder 3">
-            <a:extLst>
-              <a:ext uri="{FF2B5EF4-FFF2-40B4-BE49-F238E27FC236}">
-                <a16:creationId xmlns:a16="http://schemas.microsoft.com/office/drawing/2014/main" id="{4F31A03D-9B2C-4985-AB0F-1D5E8969B603}"/>
-              </a:ext>
-            </a:extLst>
-          </p:cNvPr>
-          <p:cNvSpPr>
-            <a:spLocks noGrp="1"/>
-          </p:cNvSpPr>
-          <p:nvPr>
-            <p:ph type="body" sz="quarter" idx="32"/>
+              <a:rPr lang="en-US" sz="2400" dirty="0"/>
+              <a:t>Q &amp; A</a:t>
+            </a:r>
+          </a:p>
+        </p:txBody>
+      </p:sp>
+      <p:sp>
+        <p:nvSpPr>
+          <p:cNvPr id="3" name="Footer Placeholder 2">
+            <a:extLst>
+              <a:ext uri="{FF2B5EF4-FFF2-40B4-BE49-F238E27FC236}">
+                <a16:creationId xmlns:a16="http://schemas.microsoft.com/office/drawing/2014/main" id="{301D9E81-FD75-4BC6-8FCB-56C6744CFE2F}"/>
+              </a:ext>
+            </a:extLst>
+          </p:cNvPr>
+          <p:cNvSpPr>
+            <a:spLocks noGrp="1"/>
+          </p:cNvSpPr>
+          <p:nvPr>
+            <p:ph type="ftr" sz="quarter" idx="13"/>
           </p:nvPr>
         </p:nvSpPr>
         <p:spPr/>
@@ -17350,31 +17423,6 @@
           <a:bodyPr/>
           <a:lstStyle/>
           <a:p>
-            <a:endParaRPr lang="en-IN"/>
-          </a:p>
-        </p:txBody>
-      </p:sp>
-      <p:sp>
-        <p:nvSpPr>
-          <p:cNvPr id="6" name="Footer Placeholder 5">
-            <a:extLst>
-              <a:ext uri="{FF2B5EF4-FFF2-40B4-BE49-F238E27FC236}">
-                <a16:creationId xmlns:a16="http://schemas.microsoft.com/office/drawing/2014/main" id="{A1C8734D-A757-4629-AD01-C77D464D8F04}"/>
-              </a:ext>
-            </a:extLst>
-          </p:cNvPr>
-          <p:cNvSpPr>
-            <a:spLocks noGrp="1"/>
-          </p:cNvSpPr>
-          <p:nvPr>
-            <p:ph type="ftr" sz="quarter" idx="13"/>
-          </p:nvPr>
-        </p:nvSpPr>
-        <p:spPr/>
-        <p:txBody>
-          <a:bodyPr/>
-          <a:lstStyle/>
-          <a:p>
             <a:r>
               <a:rPr lang="en-US" noProof="0"/>
               <a:t>Soumya Mondal @ 2023</a:t>
@@ -17385,18 +17433,18 @@
       </p:sp>
       <p:sp>
         <p:nvSpPr>
-          <p:cNvPr id="7" name="Slide Number Placeholder 6">
-            <a:extLst>
-              <a:ext uri="{FF2B5EF4-FFF2-40B4-BE49-F238E27FC236}">
-                <a16:creationId xmlns:a16="http://schemas.microsoft.com/office/drawing/2014/main" id="{88FE1683-CD2E-465B-8A82-DB74174413FF}"/>
-              </a:ext>
-            </a:extLst>
-          </p:cNvPr>
-          <p:cNvSpPr>
-            <a:spLocks noGrp="1"/>
-          </p:cNvSpPr>
-          <p:nvPr>
-            <p:ph type="sldNum" sz="quarter" idx="33"/>
+          <p:cNvPr id="2" name="Slide Number Placeholder 1">
+            <a:extLst>
+              <a:ext uri="{FF2B5EF4-FFF2-40B4-BE49-F238E27FC236}">
+                <a16:creationId xmlns:a16="http://schemas.microsoft.com/office/drawing/2014/main" id="{5DA79D21-57EC-47FA-9F9E-A437FC8E1EC6}"/>
+              </a:ext>
+            </a:extLst>
+          </p:cNvPr>
+          <p:cNvSpPr>
+            <a:spLocks noGrp="1"/>
+          </p:cNvSpPr>
+          <p:nvPr>
+            <p:ph type="sldNum" sz="quarter" idx="15"/>
           </p:nvPr>
         </p:nvSpPr>
         <p:spPr/>
@@ -17415,122 +17463,36 @@
       </p:sp>
       <p:sp>
         <p:nvSpPr>
-          <p:cNvPr id="8" name="TextBox 7">
-            <a:extLst>
-              <a:ext uri="{FF2B5EF4-FFF2-40B4-BE49-F238E27FC236}">
-                <a16:creationId xmlns:a16="http://schemas.microsoft.com/office/drawing/2014/main" id="{DB9D1DB0-D0B9-47DF-A5BB-6205D1C35B75}"/>
-              </a:ext>
-            </a:extLst>
-          </p:cNvPr>
-          <p:cNvSpPr txBox="1"/>
-          <p:nvPr/>
-        </p:nvSpPr>
-        <p:spPr>
-          <a:xfrm>
-            <a:off x="597159" y="270588"/>
-            <a:ext cx="3928187" cy="5632311"/>
-          </a:xfrm>
-          <a:prstGeom prst="rect">
-            <a:avLst/>
-          </a:prstGeom>
-          <a:noFill/>
-        </p:spPr>
-        <p:txBody>
-          <a:bodyPr wrap="square" rtlCol="0">
-            <a:spAutoFit/>
-          </a:bodyPr>
+          <p:cNvPr id="11" name="Title 10" hidden="1">
+            <a:extLst>
+              <a:ext uri="{FF2B5EF4-FFF2-40B4-BE49-F238E27FC236}">
+                <a16:creationId xmlns:a16="http://schemas.microsoft.com/office/drawing/2014/main" id="{C5462610-1D7E-437B-B516-F30D9A789B9B}"/>
+              </a:ext>
+            </a:extLst>
+          </p:cNvPr>
+          <p:cNvSpPr>
+            <a:spLocks noGrp="1"/>
+          </p:cNvSpPr>
+          <p:nvPr>
+            <p:ph type="title"/>
+          </p:nvPr>
+        </p:nvSpPr>
+        <p:spPr/>
+        <p:txBody>
+          <a:bodyPr/>
           <a:lstStyle/>
           <a:p>
-            <a:pPr marL="342900" indent="-342900">
-              <a:buAutoNum type="arabicPeriod"/>
-            </a:pPr>
-            <a:r>
-              <a:rPr lang="en-IN" dirty="0"/>
-              <a:t>Enhancement of health with Db check by </a:t>
-            </a:r>
-            <a:r>
-              <a:rPr lang="en-IN" dirty="0" err="1"/>
-              <a:t>HealthIndicator</a:t>
-            </a:r>
-            <a:r>
-              <a:rPr lang="en-IN" dirty="0"/>
-              <a:t> </a:t>
-            </a:r>
-            <a:r>
-              <a:rPr lang="en-IN" dirty="0" err="1"/>
-              <a:t>api</a:t>
-            </a:r>
-            <a:endParaRPr lang="en-IN" dirty="0"/>
-          </a:p>
-          <a:p>
-            <a:pPr marL="342900" indent="-342900">
-              <a:buAutoNum type="arabicPeriod"/>
-            </a:pPr>
-            <a:r>
-              <a:rPr lang="en-IN" dirty="0"/>
-              <a:t>Having functionality of update profile of Funder and Fund raiser(back end is implemented though)</a:t>
-            </a:r>
-          </a:p>
-          <a:p>
-            <a:pPr marL="342900" indent="-342900">
-              <a:buAutoNum type="arabicPeriod"/>
-            </a:pPr>
-            <a:r>
-              <a:rPr lang="en-IN" dirty="0"/>
-              <a:t>Image of project /profile image and profile handling by AWS S3</a:t>
-            </a:r>
-          </a:p>
-          <a:p>
-            <a:pPr marL="342900" indent="-342900">
-              <a:buAutoNum type="arabicPeriod"/>
-            </a:pPr>
-            <a:r>
-              <a:rPr lang="en-IN" dirty="0"/>
-              <a:t>Chatting of funder and fundraiser functionality by Db and instant chatting window in UI</a:t>
-            </a:r>
-          </a:p>
-          <a:p>
-            <a:pPr marL="342900" indent="-342900">
-              <a:buAutoNum type="arabicPeriod"/>
-            </a:pPr>
-            <a:r>
-              <a:rPr lang="en-IN" dirty="0"/>
-              <a:t>Relationship of funder with funds being contributed. For time constraint it has been made  simple.</a:t>
-            </a:r>
-          </a:p>
-          <a:p>
-            <a:pPr marL="342900" indent="-342900">
-              <a:buAutoNum type="arabicPeriod"/>
-            </a:pPr>
-            <a:r>
-              <a:rPr lang="en-IN" dirty="0"/>
-              <a:t>Rating system of Fundraiser by overall collection. </a:t>
-            </a:r>
-          </a:p>
-          <a:p>
-            <a:pPr marL="342900" indent="-342900">
-              <a:buAutoNum type="arabicPeriod"/>
-            </a:pPr>
-            <a:r>
-              <a:rPr lang="en-IN" dirty="0"/>
-              <a:t>Addition of payment gateway for practical disbursement and addition of bank account/</a:t>
-            </a:r>
-            <a:r>
-              <a:rPr lang="en-IN" dirty="0" err="1"/>
-              <a:t>upi</a:t>
-            </a:r>
-            <a:r>
-              <a:rPr lang="en-IN"/>
-              <a:t> etc.</a:t>
-            </a:r>
-            <a:endParaRPr lang="en-IN" dirty="0"/>
+            <a:r>
+              <a:rPr lang="en-US" dirty="0"/>
+              <a:t>Large image</a:t>
+            </a:r>
           </a:p>
         </p:txBody>
       </p:sp>
     </p:spTree>
     <p:extLst>
       <p:ext uri="{BB962C8B-B14F-4D97-AF65-F5344CB8AC3E}">
-        <p14:creationId xmlns:p14="http://schemas.microsoft.com/office/powerpoint/2010/main" val="4193078005"/>
+        <p14:creationId xmlns:p14="http://schemas.microsoft.com/office/powerpoint/2010/main" val="665219316"/>
       </p:ext>
     </p:extLst>
   </p:cSld>
@@ -17559,193 +17521,6 @@
       </p:grpSpPr>
       <p:pic>
         <p:nvPicPr>
-          <p:cNvPr id="12" name="Picture Placeholder 11" descr="conference room">
-            <a:extLst>
-              <a:ext uri="{FF2B5EF4-FFF2-40B4-BE49-F238E27FC236}">
-                <a16:creationId xmlns:a16="http://schemas.microsoft.com/office/drawing/2014/main" id="{8F5AE0D5-C196-A947-8AFE-449A48B26153}"/>
-              </a:ext>
-            </a:extLst>
-          </p:cNvPr>
-          <p:cNvPicPr>
-            <a:picLocks noGrp="1" noChangeAspect="1"/>
-          </p:cNvPicPr>
-          <p:nvPr>
-            <p:ph type="pic" sz="quarter" idx="14"/>
-          </p:nvPr>
-        </p:nvPicPr>
-        <p:blipFill>
-          <a:blip r:embed="rId2" cstate="screen">
-            <a:extLst>
-              <a:ext uri="{28A0092B-C50C-407E-A947-70E740481C1C}">
-                <a14:useLocalDpi xmlns:a14="http://schemas.microsoft.com/office/drawing/2010/main"/>
-              </a:ext>
-            </a:extLst>
-          </a:blip>
-          <a:srcRect t="45" b="45"/>
-          <a:stretch>
-            <a:fillRect/>
-          </a:stretch>
-        </p:blipFill>
-        <p:spPr/>
-      </p:pic>
-      <p:sp>
-        <p:nvSpPr>
-          <p:cNvPr id="4" name="Content Placeholder 3">
-            <a:extLst>
-              <a:ext uri="{FF2B5EF4-FFF2-40B4-BE49-F238E27FC236}">
-                <a16:creationId xmlns:a16="http://schemas.microsoft.com/office/drawing/2014/main" id="{3B86E961-B76E-423F-995E-11B31E921437}"/>
-              </a:ext>
-            </a:extLst>
-          </p:cNvPr>
-          <p:cNvSpPr>
-            <a:spLocks noGrp="1"/>
-          </p:cNvSpPr>
-          <p:nvPr>
-            <p:ph sz="half" idx="1"/>
-          </p:nvPr>
-        </p:nvSpPr>
-        <p:spPr>
-          <a:xfrm>
-            <a:off x="10566400" y="4445000"/>
-            <a:ext cx="1193600" cy="1480299"/>
-          </a:xfrm>
-          <a:solidFill>
-            <a:schemeClr val="tx1">
-              <a:lumMod val="95000"/>
-              <a:lumOff val="5000"/>
-            </a:schemeClr>
-          </a:solidFill>
-        </p:spPr>
-        <p:txBody>
-          <a:bodyPr/>
-          <a:lstStyle/>
-          <a:p>
-            <a:r>
-              <a:rPr lang="en-US" sz="2400" dirty="0"/>
-              <a:t>Q &amp; A</a:t>
-            </a:r>
-          </a:p>
-        </p:txBody>
-      </p:sp>
-      <p:sp>
-        <p:nvSpPr>
-          <p:cNvPr id="3" name="Footer Placeholder 2">
-            <a:extLst>
-              <a:ext uri="{FF2B5EF4-FFF2-40B4-BE49-F238E27FC236}">
-                <a16:creationId xmlns:a16="http://schemas.microsoft.com/office/drawing/2014/main" id="{301D9E81-FD75-4BC6-8FCB-56C6744CFE2F}"/>
-              </a:ext>
-            </a:extLst>
-          </p:cNvPr>
-          <p:cNvSpPr>
-            <a:spLocks noGrp="1"/>
-          </p:cNvSpPr>
-          <p:nvPr>
-            <p:ph type="ftr" sz="quarter" idx="13"/>
-          </p:nvPr>
-        </p:nvSpPr>
-        <p:spPr/>
-        <p:txBody>
-          <a:bodyPr/>
-          <a:lstStyle/>
-          <a:p>
-            <a:r>
-              <a:rPr lang="en-US" noProof="0"/>
-              <a:t>Soumya Mondal @ 2023</a:t>
-            </a:r>
-            <a:endParaRPr lang="en-US" noProof="0" dirty="0"/>
-          </a:p>
-        </p:txBody>
-      </p:sp>
-      <p:sp>
-        <p:nvSpPr>
-          <p:cNvPr id="2" name="Slide Number Placeholder 1">
-            <a:extLst>
-              <a:ext uri="{FF2B5EF4-FFF2-40B4-BE49-F238E27FC236}">
-                <a16:creationId xmlns:a16="http://schemas.microsoft.com/office/drawing/2014/main" id="{5DA79D21-57EC-47FA-9F9E-A437FC8E1EC6}"/>
-              </a:ext>
-            </a:extLst>
-          </p:cNvPr>
-          <p:cNvSpPr>
-            <a:spLocks noGrp="1"/>
-          </p:cNvSpPr>
-          <p:nvPr>
-            <p:ph type="sldNum" sz="quarter" idx="15"/>
-          </p:nvPr>
-        </p:nvSpPr>
-        <p:spPr/>
-        <p:txBody>
-          <a:bodyPr/>
-          <a:lstStyle/>
-          <a:p>
-            <a:fld id="{19B51A1E-902D-48AF-9020-955120F399B6}" type="slidenum">
-              <a:rPr lang="en-US" noProof="0" smtClean="0"/>
-              <a:pPr/>
-              <a:t>22</a:t>
-            </a:fld>
-            <a:endParaRPr lang="en-US" noProof="0" dirty="0"/>
-          </a:p>
-        </p:txBody>
-      </p:sp>
-      <p:sp>
-        <p:nvSpPr>
-          <p:cNvPr id="11" name="Title 10" hidden="1">
-            <a:extLst>
-              <a:ext uri="{FF2B5EF4-FFF2-40B4-BE49-F238E27FC236}">
-                <a16:creationId xmlns:a16="http://schemas.microsoft.com/office/drawing/2014/main" id="{C5462610-1D7E-437B-B516-F30D9A789B9B}"/>
-              </a:ext>
-            </a:extLst>
-          </p:cNvPr>
-          <p:cNvSpPr>
-            <a:spLocks noGrp="1"/>
-          </p:cNvSpPr>
-          <p:nvPr>
-            <p:ph type="title"/>
-          </p:nvPr>
-        </p:nvSpPr>
-        <p:spPr/>
-        <p:txBody>
-          <a:bodyPr/>
-          <a:lstStyle/>
-          <a:p>
-            <a:r>
-              <a:rPr lang="en-US" dirty="0"/>
-              <a:t>Large image</a:t>
-            </a:r>
-          </a:p>
-        </p:txBody>
-      </p:sp>
-    </p:spTree>
-    <p:extLst>
-      <p:ext uri="{BB962C8B-B14F-4D97-AF65-F5344CB8AC3E}">
-        <p14:creationId xmlns:p14="http://schemas.microsoft.com/office/powerpoint/2010/main" val="665219316"/>
-      </p:ext>
-    </p:extLst>
-  </p:cSld>
-  <p:clrMapOvr>
-    <a:masterClrMapping/>
-  </p:clrMapOvr>
-</p:sld>
-</file>
-
-<file path=ppt/slides/slide23.xml><?xml version="1.0" encoding="utf-8"?>
-<p:sld xmlns:a="http://schemas.openxmlformats.org/drawingml/2006/main" xmlns:r="http://schemas.openxmlformats.org/officeDocument/2006/relationships" xmlns:p="http://schemas.openxmlformats.org/presentationml/2006/main" showMasterSp="0">
-  <p:cSld>
-    <p:spTree>
-      <p:nvGrpSpPr>
-        <p:cNvPr id="1" name=""/>
-        <p:cNvGrpSpPr/>
-        <p:nvPr/>
-      </p:nvGrpSpPr>
-      <p:grpSpPr>
-        <a:xfrm>
-          <a:off x="0" y="0"/>
-          <a:ext cx="0" cy="0"/>
-          <a:chOff x="0" y="0"/>
-          <a:chExt cx="0" cy="0"/>
-        </a:xfrm>
-      </p:grpSpPr>
-      <p:pic>
-        <p:nvPicPr>
           <p:cNvPr id="32" name="Picture Placeholder 31" descr="hand clapping">
             <a:extLst>
               <a:ext uri="{FF2B5EF4-FFF2-40B4-BE49-F238E27FC236}">
@@ -17967,7 +17742,7 @@
             <a:fld id="{19B51A1E-902D-48AF-9020-955120F399B6}" type="slidenum">
               <a:rPr lang="en-US" noProof="0" smtClean="0"/>
               <a:pPr/>
-              <a:t>23</a:t>
+              <a:t>22</a:t>
             </a:fld>
             <a:endParaRPr lang="en-US" noProof="0" dirty="0"/>
           </a:p>
@@ -20697,15 +20472,6 @@
 </file>
 
 <file path=customXml/item1.xml><?xml version="1.0" encoding="utf-8"?>
-<?mso-contentType ?>
-<FormTemplates xmlns="http://schemas.microsoft.com/sharepoint/v3/contenttype/forms">
-  <Display>DocumentLibraryForm</Display>
-  <Edit>DocumentLibraryForm</Edit>
-  <New>DocumentLibraryForm</New>
-</FormTemplates>
-</file>
-
-<file path=customXml/item2.xml><?xml version="1.0" encoding="utf-8"?>
 <ct:contentTypeSchema xmlns:ct="http://schemas.microsoft.com/office/2006/metadata/contentType" xmlns:ma="http://schemas.microsoft.com/office/2006/metadata/properties/metaAttributes" ct:_="" ma:_="" ma:contentTypeName="Document" ma:contentTypeID="0x01010079F111ED35F8CC479449609E8A0923A6" ma:contentTypeVersion="27" ma:contentTypeDescription="Create a new document." ma:contentTypeScope="" ma:versionID="c6f9a84f66a9c8b9a21755b9ffafb945">
   <xsd:schema xmlns:xsd="http://www.w3.org/2001/XMLSchema" xmlns:xs="http://www.w3.org/2001/XMLSchema" xmlns:p="http://schemas.microsoft.com/office/2006/metadata/properties" xmlns:ns1="http://schemas.microsoft.com/sharepoint/v3" xmlns:ns2="71af3243-3dd4-4a8d-8c0d-dd76da1f02a5" xmlns:ns3="16c05727-aa75-4e4a-9b5f-8a80a1165891" xmlns:ns4="230e9df3-be65-4c73-a93b-d1236ebd677e" targetNamespace="http://schemas.microsoft.com/office/2006/metadata/properties" ma:root="true" ma:fieldsID="27df39e3e7036dff54f89ddd5805ce72" ns1:_="" ns2:_="" ns3:_="" ns4:_="">
     <xsd:import namespace="http://schemas.microsoft.com/sharepoint/v3"/>
@@ -21011,6 +20777,15 @@
 </ct:contentTypeSchema>
 </file>
 
+<file path=customXml/item2.xml><?xml version="1.0" encoding="utf-8"?>
+<?mso-contentType ?>
+<FormTemplates xmlns="http://schemas.microsoft.com/sharepoint/v3/contenttype/forms">
+  <Display>DocumentLibraryForm</Display>
+  <Edit>DocumentLibraryForm</Edit>
+  <New>DocumentLibraryForm</New>
+</FormTemplates>
+</file>
+
 <file path=customXml/item3.xml><?xml version="1.0" encoding="utf-8"?>
 <p:properties xmlns:p="http://schemas.microsoft.com/office/2006/metadata/properties" xmlns:xsi="http://www.w3.org/2001/XMLSchema-instance" xmlns:pc="http://schemas.microsoft.com/office/infopath/2007/PartnerControls">
   <documentManagement>
@@ -21032,14 +20807,6 @@
 </file>
 
 <file path=customXml/itemProps1.xml><?xml version="1.0" encoding="utf-8"?>
-<ds:datastoreItem xmlns:ds="http://schemas.openxmlformats.org/officeDocument/2006/customXml" ds:itemID="{B8E15EA0-2F38-456B-B156-038699A5D17F}">
-  <ds:schemaRefs>
-    <ds:schemaRef ds:uri="http://schemas.microsoft.com/sharepoint/v3/contenttype/forms"/>
-  </ds:schemaRefs>
-</ds:datastoreItem>
-</file>
-
-<file path=customXml/itemProps2.xml><?xml version="1.0" encoding="utf-8"?>
 <ds:datastoreItem xmlns:ds="http://schemas.openxmlformats.org/officeDocument/2006/customXml" ds:itemID="{1C245E38-7A2C-4D38-96FA-24EAC5F220C7}">
   <ds:schemaRefs>
     <ds:schemaRef ds:uri="http://schemas.microsoft.com/office/2006/metadata/contentType"/>
@@ -21060,6 +20827,14 @@
 </ds:datastoreItem>
 </file>
 
+<file path=customXml/itemProps2.xml><?xml version="1.0" encoding="utf-8"?>
+<ds:datastoreItem xmlns:ds="http://schemas.openxmlformats.org/officeDocument/2006/customXml" ds:itemID="{B8E15EA0-2F38-456B-B156-038699A5D17F}">
+  <ds:schemaRefs>
+    <ds:schemaRef ds:uri="http://schemas.microsoft.com/sharepoint/v3/contenttype/forms"/>
+  </ds:schemaRefs>
+</ds:datastoreItem>
+</file>
+
 <file path=customXml/itemProps3.xml><?xml version="1.0" encoding="utf-8"?>
 <ds:datastoreItem xmlns:ds="http://schemas.openxmlformats.org/officeDocument/2006/customXml" ds:itemID="{BF90D0D0-7C1D-47FF-A2F0-9937AA567A3D}">
   <ds:schemaRefs>

</xml_diff>